<commit_message>
Corrected the name of input parameters
</commit_message>
<xml_diff>
--- a/Theory/Theory.pptx
+++ b/Theory/Theory.pptx
@@ -5,12 +5,14 @@
     <p:sldMasterId id="2147483648" r:id="rId1"/>
   </p:sldMasterIdLst>
   <p:notesMasterIdLst>
-    <p:notesMasterId r:id="rId5"/>
+    <p:notesMasterId r:id="rId7"/>
   </p:notesMasterIdLst>
   <p:sldIdLst>
     <p:sldId id="348" r:id="rId2"/>
     <p:sldId id="349" r:id="rId3"/>
     <p:sldId id="350" r:id="rId4"/>
+    <p:sldId id="351" r:id="rId5"/>
+    <p:sldId id="352" r:id="rId6"/>
   </p:sldIdLst>
   <p:sldSz cx="12192000" cy="6858000"/>
   <p:notesSz cx="6858000" cy="9144000"/>
@@ -199,7 +201,7 @@
           <a:p>
             <a:fld id="{8B100A09-6258-4CBC-BFFF-0C7EBE57FDEE}" type="datetimeFigureOut">
               <a:rPr lang="it-IT" smtClean="0"/>
-              <a:t>27/05/2024</a:t>
+              <a:t>04/06/2024</a:t>
             </a:fld>
             <a:endParaRPr lang="it-IT"/>
           </a:p>
@@ -616,7 +618,7 @@
           <a:p>
             <a:fld id="{9BF855F3-461B-4BA2-9DCE-DF1C5FBC8FF1}" type="datetimeFigureOut">
               <a:rPr lang="it-IT" smtClean="0"/>
-              <a:t>27/05/2024</a:t>
+              <a:t>04/06/2024</a:t>
             </a:fld>
             <a:endParaRPr lang="it-IT"/>
           </a:p>
@@ -816,7 +818,7 @@
           <a:p>
             <a:fld id="{9BF855F3-461B-4BA2-9DCE-DF1C5FBC8FF1}" type="datetimeFigureOut">
               <a:rPr lang="it-IT" smtClean="0"/>
-              <a:t>27/05/2024</a:t>
+              <a:t>04/06/2024</a:t>
             </a:fld>
             <a:endParaRPr lang="it-IT"/>
           </a:p>
@@ -1026,7 +1028,7 @@
           <a:p>
             <a:fld id="{9BF855F3-461B-4BA2-9DCE-DF1C5FBC8FF1}" type="datetimeFigureOut">
               <a:rPr lang="it-IT" smtClean="0"/>
-              <a:t>27/05/2024</a:t>
+              <a:t>04/06/2024</a:t>
             </a:fld>
             <a:endParaRPr lang="it-IT"/>
           </a:p>
@@ -1226,7 +1228,7 @@
           <a:p>
             <a:fld id="{9BF855F3-461B-4BA2-9DCE-DF1C5FBC8FF1}" type="datetimeFigureOut">
               <a:rPr lang="it-IT" smtClean="0"/>
-              <a:t>27/05/2024</a:t>
+              <a:t>04/06/2024</a:t>
             </a:fld>
             <a:endParaRPr lang="it-IT"/>
           </a:p>
@@ -1502,7 +1504,7 @@
           <a:p>
             <a:fld id="{9BF855F3-461B-4BA2-9DCE-DF1C5FBC8FF1}" type="datetimeFigureOut">
               <a:rPr lang="it-IT" smtClean="0"/>
-              <a:t>27/05/2024</a:t>
+              <a:t>04/06/2024</a:t>
             </a:fld>
             <a:endParaRPr lang="it-IT"/>
           </a:p>
@@ -1770,7 +1772,7 @@
           <a:p>
             <a:fld id="{9BF855F3-461B-4BA2-9DCE-DF1C5FBC8FF1}" type="datetimeFigureOut">
               <a:rPr lang="it-IT" smtClean="0"/>
-              <a:t>27/05/2024</a:t>
+              <a:t>04/06/2024</a:t>
             </a:fld>
             <a:endParaRPr lang="it-IT"/>
           </a:p>
@@ -2185,7 +2187,7 @@
           <a:p>
             <a:fld id="{9BF855F3-461B-4BA2-9DCE-DF1C5FBC8FF1}" type="datetimeFigureOut">
               <a:rPr lang="it-IT" smtClean="0"/>
-              <a:t>27/05/2024</a:t>
+              <a:t>04/06/2024</a:t>
             </a:fld>
             <a:endParaRPr lang="it-IT"/>
           </a:p>
@@ -2327,7 +2329,7 @@
           <a:p>
             <a:fld id="{9BF855F3-461B-4BA2-9DCE-DF1C5FBC8FF1}" type="datetimeFigureOut">
               <a:rPr lang="it-IT" smtClean="0"/>
-              <a:t>27/05/2024</a:t>
+              <a:t>04/06/2024</a:t>
             </a:fld>
             <a:endParaRPr lang="it-IT"/>
           </a:p>
@@ -2440,7 +2442,7 @@
           <a:p>
             <a:fld id="{9BF855F3-461B-4BA2-9DCE-DF1C5FBC8FF1}" type="datetimeFigureOut">
               <a:rPr lang="it-IT" smtClean="0"/>
-              <a:t>27/05/2024</a:t>
+              <a:t>04/06/2024</a:t>
             </a:fld>
             <a:endParaRPr lang="it-IT"/>
           </a:p>
@@ -2753,7 +2755,7 @@
           <a:p>
             <a:fld id="{9BF855F3-461B-4BA2-9DCE-DF1C5FBC8FF1}" type="datetimeFigureOut">
               <a:rPr lang="it-IT" smtClean="0"/>
-              <a:t>27/05/2024</a:t>
+              <a:t>04/06/2024</a:t>
             </a:fld>
             <a:endParaRPr lang="it-IT"/>
           </a:p>
@@ -3042,7 +3044,7 @@
           <a:p>
             <a:fld id="{9BF855F3-461B-4BA2-9DCE-DF1C5FBC8FF1}" type="datetimeFigureOut">
               <a:rPr lang="it-IT" smtClean="0"/>
-              <a:t>27/05/2024</a:t>
+              <a:t>04/06/2024</a:t>
             </a:fld>
             <a:endParaRPr lang="it-IT"/>
           </a:p>
@@ -3285,7 +3287,7 @@
           <a:p>
             <a:fld id="{9BF855F3-461B-4BA2-9DCE-DF1C5FBC8FF1}" type="datetimeFigureOut">
               <a:rPr lang="it-IT" smtClean="0"/>
-              <a:t>27/05/2024</a:t>
+              <a:t>04/06/2024</a:t>
             </a:fld>
             <a:endParaRPr lang="it-IT"/>
           </a:p>
@@ -4540,6 +4542,655 @@
 </file>
 
 <file path=ppt/slides/slide3.xml><?xml version="1.0" encoding="utf-8"?>
+<p:sld xmlns:a="http://schemas.openxmlformats.org/drawingml/2006/main" xmlns:r="http://schemas.openxmlformats.org/officeDocument/2006/relationships" xmlns:p="http://schemas.openxmlformats.org/presentationml/2006/main" show="0">
+  <p:cSld>
+    <p:spTree>
+      <p:nvGrpSpPr>
+        <p:cNvPr id="1" name="">
+          <a:extLst>
+            <a:ext uri="{FF2B5EF4-FFF2-40B4-BE49-F238E27FC236}">
+              <a16:creationId xmlns:a16="http://schemas.microsoft.com/office/drawing/2014/main" id="{AF51C3CA-54D4-7362-9EEE-CACD920E2666}"/>
+            </a:ext>
+          </a:extLst>
+        </p:cNvPr>
+        <p:cNvGrpSpPr/>
+        <p:nvPr/>
+      </p:nvGrpSpPr>
+      <p:grpSpPr>
+        <a:xfrm>
+          <a:off x="0" y="0"/>
+          <a:ext cx="0" cy="0"/>
+          <a:chOff x="0" y="0"/>
+          <a:chExt cx="0" cy="0"/>
+        </a:xfrm>
+      </p:grpSpPr>
+      <p:sp>
+        <p:nvSpPr>
+          <p:cNvPr id="4" name="TextBox 3">
+            <a:extLst>
+              <a:ext uri="{FF2B5EF4-FFF2-40B4-BE49-F238E27FC236}">
+                <a16:creationId xmlns:a16="http://schemas.microsoft.com/office/drawing/2014/main" id="{5C826AB2-3C46-7C61-7717-6E78C3B4D762}"/>
+              </a:ext>
+            </a:extLst>
+          </p:cNvPr>
+          <p:cNvSpPr txBox="1"/>
+          <p:nvPr/>
+        </p:nvSpPr>
+        <p:spPr>
+          <a:xfrm>
+            <a:off x="3655459" y="233562"/>
+            <a:ext cx="4451677" cy="646331"/>
+          </a:xfrm>
+          <a:prstGeom prst="rect">
+            <a:avLst/>
+          </a:prstGeom>
+          <a:noFill/>
+        </p:spPr>
+        <p:txBody>
+          <a:bodyPr wrap="square" rtlCol="0">
+            <a:spAutoFit/>
+          </a:bodyPr>
+          <a:lstStyle/>
+          <a:p>
+            <a:pPr marL="0" marR="0" lvl="0" indent="0" algn="l" defTabSz="914400" rtl="0" eaLnBrk="1" fontAlgn="auto" latinLnBrk="0" hangingPunct="1">
+              <a:lnSpc>
+                <a:spcPct val="100000"/>
+              </a:lnSpc>
+              <a:spcBef>
+                <a:spcPts val="0"/>
+              </a:spcBef>
+              <a:spcAft>
+                <a:spcPts val="0"/>
+              </a:spcAft>
+              <a:buClrTx/>
+              <a:buSzTx/>
+              <a:buFontTx/>
+              <a:buNone/>
+              <a:tabLst/>
+              <a:defRPr/>
+            </a:pPr>
+            <a:r>
+              <a:rPr kumimoji="0" lang="it-IT" sz="3600" b="0" i="0" u="none" strike="noStrike" kern="1200" cap="none" spc="0" normalizeH="0" baseline="0" noProof="0" dirty="0">
+                <a:ln>
+                  <a:noFill/>
+                </a:ln>
+                <a:effectLst/>
+                <a:uLnTx/>
+                <a:uFillTx/>
+                <a:latin typeface="Museo Sans Condensed" panose="02000000000000000000"/>
+                <a:ea typeface="+mn-ea"/>
+                <a:cs typeface="+mn-cs"/>
+              </a:rPr>
+              <a:t>A Community </a:t>
+            </a:r>
+            <a:r>
+              <a:rPr kumimoji="0" lang="it-IT" sz="3600" b="0" i="0" u="none" strike="noStrike" kern="1200" cap="none" spc="0" normalizeH="0" baseline="0" noProof="0" dirty="0" err="1">
+                <a:ln>
+                  <a:noFill/>
+                </a:ln>
+                <a:effectLst/>
+                <a:uLnTx/>
+                <a:uFillTx/>
+                <a:latin typeface="Museo Sans Condensed" panose="02000000000000000000"/>
+                <a:ea typeface="+mn-ea"/>
+                <a:cs typeface="+mn-cs"/>
+              </a:rPr>
+              <a:t>Structure</a:t>
+            </a:r>
+            <a:endParaRPr kumimoji="0" lang="it-IT" sz="3600" b="0" i="0" u="none" strike="noStrike" kern="1200" cap="none" spc="0" normalizeH="0" baseline="0" noProof="0" dirty="0">
+              <a:ln>
+                <a:noFill/>
+              </a:ln>
+              <a:effectLst/>
+              <a:uLnTx/>
+              <a:uFillTx/>
+              <a:latin typeface="Museo Sans Condensed" panose="02000000000000000000"/>
+              <a:ea typeface="+mn-ea"/>
+              <a:cs typeface="+mn-cs"/>
+            </a:endParaRPr>
+          </a:p>
+        </p:txBody>
+      </p:sp>
+      <p:sp>
+        <p:nvSpPr>
+          <p:cNvPr id="2" name="TextBox 1">
+            <a:extLst>
+              <a:ext uri="{FF2B5EF4-FFF2-40B4-BE49-F238E27FC236}">
+                <a16:creationId xmlns:a16="http://schemas.microsoft.com/office/drawing/2014/main" id="{80DAD55C-AF5F-0FA1-C795-C5DA7237A314}"/>
+              </a:ext>
+            </a:extLst>
+          </p:cNvPr>
+          <p:cNvSpPr txBox="1"/>
+          <p:nvPr/>
+        </p:nvSpPr>
+        <p:spPr>
+          <a:xfrm>
+            <a:off x="427844" y="1349347"/>
+            <a:ext cx="4152320" cy="461665"/>
+          </a:xfrm>
+          <a:prstGeom prst="rect">
+            <a:avLst/>
+          </a:prstGeom>
+          <a:noFill/>
+        </p:spPr>
+        <p:txBody>
+          <a:bodyPr wrap="square" rtlCol="0">
+            <a:spAutoFit/>
+          </a:bodyPr>
+          <a:lstStyle/>
+          <a:p>
+            <a:pPr marL="0" marR="0" lvl="0" indent="0" algn="l" defTabSz="914400" rtl="0" eaLnBrk="1" fontAlgn="auto" latinLnBrk="0" hangingPunct="1">
+              <a:lnSpc>
+                <a:spcPct val="100000"/>
+              </a:lnSpc>
+              <a:spcBef>
+                <a:spcPts val="0"/>
+              </a:spcBef>
+              <a:spcAft>
+                <a:spcPts val="0"/>
+              </a:spcAft>
+              <a:buClrTx/>
+              <a:buSzTx/>
+              <a:buFontTx/>
+              <a:buNone/>
+              <a:tabLst/>
+              <a:defRPr/>
+            </a:pPr>
+            <a:r>
+              <a:rPr kumimoji="0" lang="it-IT" sz="2400" b="0" i="0" u="none" strike="noStrike" kern="1200" cap="none" spc="0" normalizeH="0" baseline="0" noProof="0" dirty="0">
+                <a:ln>
+                  <a:noFill/>
+                </a:ln>
+                <a:effectLst/>
+                <a:uLnTx/>
+                <a:uFillTx/>
+                <a:latin typeface="Museo Sans Condensed" panose="02000000000000000000"/>
+                <a:ea typeface="+mn-ea"/>
+                <a:cs typeface="+mn-cs"/>
+              </a:rPr>
+              <a:t>Community </a:t>
+            </a:r>
+            <a:r>
+              <a:rPr kumimoji="0" lang="it-IT" sz="2400" b="0" i="0" u="none" strike="noStrike" kern="1200" cap="none" spc="0" normalizeH="0" baseline="0" noProof="0" dirty="0" err="1">
+                <a:ln>
+                  <a:noFill/>
+                </a:ln>
+                <a:effectLst/>
+                <a:uLnTx/>
+                <a:uFillTx/>
+                <a:latin typeface="Museo Sans Condensed" panose="02000000000000000000"/>
+                <a:ea typeface="+mn-ea"/>
+                <a:cs typeface="+mn-cs"/>
+              </a:rPr>
+              <a:t>Structure</a:t>
+            </a:r>
+            <a:r>
+              <a:rPr kumimoji="0" lang="it-IT" sz="2400" b="0" i="0" u="none" strike="noStrike" kern="1200" cap="none" spc="0" normalizeH="0" baseline="0" noProof="0" dirty="0">
+                <a:ln>
+                  <a:noFill/>
+                </a:ln>
+                <a:effectLst/>
+                <a:uLnTx/>
+                <a:uFillTx/>
+                <a:latin typeface="Museo Sans Condensed" panose="02000000000000000000"/>
+                <a:ea typeface="+mn-ea"/>
+                <a:cs typeface="+mn-cs"/>
+              </a:rPr>
+              <a:t> Definition:</a:t>
+            </a:r>
+          </a:p>
+        </p:txBody>
+      </p:sp>
+      <p:sp>
+        <p:nvSpPr>
+          <p:cNvPr id="5" name="TextBox 4">
+            <a:extLst>
+              <a:ext uri="{FF2B5EF4-FFF2-40B4-BE49-F238E27FC236}">
+                <a16:creationId xmlns:a16="http://schemas.microsoft.com/office/drawing/2014/main" id="{FD3B8CFF-DD63-475D-4AD4-7786430943EE}"/>
+              </a:ext>
+            </a:extLst>
+          </p:cNvPr>
+          <p:cNvSpPr txBox="1"/>
+          <p:nvPr/>
+        </p:nvSpPr>
+        <p:spPr>
+          <a:xfrm>
+            <a:off x="4696506" y="1440509"/>
+            <a:ext cx="6094638" cy="646331"/>
+          </a:xfrm>
+          <a:prstGeom prst="rect">
+            <a:avLst/>
+          </a:prstGeom>
+          <a:noFill/>
+        </p:spPr>
+        <p:txBody>
+          <a:bodyPr wrap="square">
+            <a:spAutoFit/>
+          </a:bodyPr>
+          <a:lstStyle/>
+          <a:p>
+            <a:r>
+              <a:rPr kumimoji="0" lang="it-IT" sz="1800" b="0" i="0" u="none" strike="noStrike" kern="1200" cap="none" spc="0" normalizeH="0" baseline="0" noProof="0" dirty="0">
+                <a:ln>
+                  <a:noFill/>
+                </a:ln>
+                <a:effectLst/>
+                <a:uLnTx/>
+                <a:uFillTx/>
+                <a:latin typeface="Museo Sans"/>
+              </a:rPr>
+              <a:t>A subset of </a:t>
+            </a:r>
+            <a:r>
+              <a:rPr kumimoji="0" lang="it-IT" sz="1800" b="0" i="0" u="none" strike="noStrike" kern="1200" cap="none" spc="0" normalizeH="0" baseline="0" noProof="0" dirty="0" err="1">
+                <a:ln>
+                  <a:noFill/>
+                </a:ln>
+                <a:effectLst/>
+                <a:uLnTx/>
+                <a:uFillTx/>
+                <a:latin typeface="Museo Sans"/>
+              </a:rPr>
+              <a:t>nodes</a:t>
+            </a:r>
+            <a:r>
+              <a:rPr kumimoji="0" lang="it-IT" sz="1800" b="0" i="0" u="none" strike="noStrike" kern="1200" cap="none" spc="0" normalizeH="0" baseline="0" noProof="0" dirty="0">
+                <a:ln>
+                  <a:noFill/>
+                </a:ln>
+                <a:effectLst/>
+                <a:uLnTx/>
+                <a:uFillTx/>
+                <a:latin typeface="Museo Sans"/>
+              </a:rPr>
+              <a:t> </a:t>
+            </a:r>
+            <a:r>
+              <a:rPr kumimoji="0" lang="en-US" sz="1800" b="0" i="0" u="none" strike="noStrike" kern="1200" cap="none" spc="0" normalizeH="0" baseline="0" noProof="0" dirty="0">
+                <a:ln>
+                  <a:noFill/>
+                </a:ln>
+                <a:effectLst/>
+                <a:uLnTx/>
+                <a:uFillTx/>
+                <a:latin typeface="Museo Sans"/>
+              </a:rPr>
+              <a:t>who have a strong internal connection and a weaker connection with elements outside the community</a:t>
+            </a:r>
+            <a:endParaRPr lang="it-IT" dirty="0">
+              <a:latin typeface="Museo Sans"/>
+            </a:endParaRPr>
+          </a:p>
+        </p:txBody>
+      </p:sp>
+      <p:sp>
+        <p:nvSpPr>
+          <p:cNvPr id="6" name="TextBox 5">
+            <a:extLst>
+              <a:ext uri="{FF2B5EF4-FFF2-40B4-BE49-F238E27FC236}">
+                <a16:creationId xmlns:a16="http://schemas.microsoft.com/office/drawing/2014/main" id="{0E6D3760-F9DD-4E06-ABC2-47F532335ABC}"/>
+              </a:ext>
+            </a:extLst>
+          </p:cNvPr>
+          <p:cNvSpPr txBox="1"/>
+          <p:nvPr/>
+        </p:nvSpPr>
+        <p:spPr>
+          <a:xfrm>
+            <a:off x="427843" y="2557464"/>
+            <a:ext cx="3227615" cy="461665"/>
+          </a:xfrm>
+          <a:prstGeom prst="rect">
+            <a:avLst/>
+          </a:prstGeom>
+          <a:noFill/>
+        </p:spPr>
+        <p:txBody>
+          <a:bodyPr wrap="square" rtlCol="0">
+            <a:spAutoFit/>
+          </a:bodyPr>
+          <a:lstStyle/>
+          <a:p>
+            <a:pPr marL="0" marR="0" lvl="0" indent="0" algn="l" defTabSz="914400" rtl="0" eaLnBrk="1" fontAlgn="auto" latinLnBrk="0" hangingPunct="1">
+              <a:lnSpc>
+                <a:spcPct val="100000"/>
+              </a:lnSpc>
+              <a:spcBef>
+                <a:spcPts val="0"/>
+              </a:spcBef>
+              <a:spcAft>
+                <a:spcPts val="0"/>
+              </a:spcAft>
+              <a:buClrTx/>
+              <a:buSzTx/>
+              <a:buFontTx/>
+              <a:buNone/>
+              <a:tabLst/>
+              <a:defRPr/>
+            </a:pPr>
+            <a:r>
+              <a:rPr kumimoji="0" lang="it-IT" sz="2400" b="0" i="0" u="none" strike="noStrike" kern="1200" cap="none" spc="0" normalizeH="0" baseline="0" noProof="0" dirty="0" err="1">
+                <a:ln>
+                  <a:noFill/>
+                </a:ln>
+                <a:effectLst/>
+                <a:uLnTx/>
+                <a:uFillTx/>
+                <a:latin typeface="Museo Sans Condensed" panose="02000000000000000000"/>
+                <a:ea typeface="+mn-ea"/>
+                <a:cs typeface="+mn-cs"/>
+              </a:rPr>
+              <a:t>Why</a:t>
+            </a:r>
+            <a:r>
+              <a:rPr kumimoji="0" lang="it-IT" sz="2400" b="0" i="0" u="none" strike="noStrike" kern="1200" cap="none" spc="0" normalizeH="0" baseline="0" noProof="0" dirty="0">
+                <a:ln>
+                  <a:noFill/>
+                </a:ln>
+                <a:effectLst/>
+                <a:uLnTx/>
+                <a:uFillTx/>
+                <a:latin typeface="Museo Sans Condensed" panose="02000000000000000000"/>
+                <a:ea typeface="+mn-ea"/>
+                <a:cs typeface="+mn-cs"/>
+              </a:rPr>
+              <a:t>?</a:t>
+            </a:r>
+          </a:p>
+        </p:txBody>
+      </p:sp>
+      <p:sp>
+        <p:nvSpPr>
+          <p:cNvPr id="7" name="TextBox 6">
+            <a:extLst>
+              <a:ext uri="{FF2B5EF4-FFF2-40B4-BE49-F238E27FC236}">
+                <a16:creationId xmlns:a16="http://schemas.microsoft.com/office/drawing/2014/main" id="{22A29129-98A4-A465-7CED-465253C89CAA}"/>
+              </a:ext>
+            </a:extLst>
+          </p:cNvPr>
+          <p:cNvSpPr txBox="1"/>
+          <p:nvPr/>
+        </p:nvSpPr>
+        <p:spPr>
+          <a:xfrm>
+            <a:off x="1248455" y="2592751"/>
+            <a:ext cx="6736216" cy="646331"/>
+          </a:xfrm>
+          <a:prstGeom prst="rect">
+            <a:avLst/>
+          </a:prstGeom>
+          <a:noFill/>
+        </p:spPr>
+        <p:txBody>
+          <a:bodyPr wrap="square">
+            <a:spAutoFit/>
+          </a:bodyPr>
+          <a:lstStyle/>
+          <a:p>
+            <a:r>
+              <a:rPr kumimoji="0" lang="en-US" sz="1800" b="0" i="0" u="none" strike="noStrike" kern="1200" cap="none" spc="0" normalizeH="0" baseline="0" noProof="0" dirty="0">
+                <a:ln>
+                  <a:noFill/>
+                </a:ln>
+                <a:effectLst/>
+                <a:uLnTx/>
+                <a:uFillTx/>
+                <a:latin typeface="Museo Sans"/>
+              </a:rPr>
+              <a:t>Identify groups of nodes with similar relationships or interactions to understand the structure and functionality of the graph.</a:t>
+            </a:r>
+            <a:endParaRPr lang="it-IT" dirty="0">
+              <a:latin typeface="Museo Sans"/>
+            </a:endParaRPr>
+          </a:p>
+        </p:txBody>
+      </p:sp>
+      <p:sp>
+        <p:nvSpPr>
+          <p:cNvPr id="8" name="TextBox 7">
+            <a:extLst>
+              <a:ext uri="{FF2B5EF4-FFF2-40B4-BE49-F238E27FC236}">
+                <a16:creationId xmlns:a16="http://schemas.microsoft.com/office/drawing/2014/main" id="{3CB6434C-F915-5351-B9F9-2D2D72BDCE7E}"/>
+              </a:ext>
+            </a:extLst>
+          </p:cNvPr>
+          <p:cNvSpPr txBox="1"/>
+          <p:nvPr/>
+        </p:nvSpPr>
+        <p:spPr>
+          <a:xfrm>
+            <a:off x="427843" y="3838872"/>
+            <a:ext cx="4993243" cy="461665"/>
+          </a:xfrm>
+          <a:prstGeom prst="rect">
+            <a:avLst/>
+          </a:prstGeom>
+          <a:noFill/>
+        </p:spPr>
+        <p:txBody>
+          <a:bodyPr wrap="square" rtlCol="0">
+            <a:spAutoFit/>
+          </a:bodyPr>
+          <a:lstStyle/>
+          <a:p>
+            <a:pPr marL="0" marR="0" lvl="0" indent="0" algn="l" defTabSz="914400" rtl="0" eaLnBrk="1" fontAlgn="auto" latinLnBrk="0" hangingPunct="1">
+              <a:lnSpc>
+                <a:spcPct val="100000"/>
+              </a:lnSpc>
+              <a:spcBef>
+                <a:spcPts val="0"/>
+              </a:spcBef>
+              <a:spcAft>
+                <a:spcPts val="0"/>
+              </a:spcAft>
+              <a:buClrTx/>
+              <a:buSzTx/>
+              <a:buFontTx/>
+              <a:buNone/>
+              <a:tabLst/>
+              <a:defRPr/>
+            </a:pPr>
+            <a:r>
+              <a:rPr kumimoji="0" lang="it-IT" sz="2400" b="0" i="0" u="none" strike="noStrike" kern="1200" cap="none" spc="0" normalizeH="0" baseline="0" noProof="0" dirty="0">
+                <a:ln>
+                  <a:noFill/>
+                </a:ln>
+                <a:effectLst/>
+                <a:uLnTx/>
+                <a:uFillTx/>
+                <a:latin typeface="Museo Sans Condensed" panose="02000000000000000000"/>
+                <a:ea typeface="+mn-ea"/>
+                <a:cs typeface="+mn-cs"/>
+              </a:rPr>
+              <a:t>How to </a:t>
+            </a:r>
+            <a:r>
+              <a:rPr lang="it-IT" sz="2400" dirty="0">
+                <a:latin typeface="Museo Sans Condensed" panose="02000000000000000000"/>
+              </a:rPr>
+              <a:t>i</a:t>
+            </a:r>
+            <a:r>
+              <a:rPr kumimoji="0" lang="it-IT" sz="2400" b="0" i="0" u="none" strike="noStrike" kern="1200" cap="none" spc="0" normalizeH="0" baseline="0" noProof="0" dirty="0" err="1">
+                <a:ln>
+                  <a:noFill/>
+                </a:ln>
+                <a:effectLst/>
+                <a:uLnTx/>
+                <a:uFillTx/>
+                <a:latin typeface="Museo Sans Condensed" panose="02000000000000000000"/>
+                <a:ea typeface="+mn-ea"/>
+                <a:cs typeface="+mn-cs"/>
+              </a:rPr>
+              <a:t>dentify</a:t>
+            </a:r>
+            <a:r>
+              <a:rPr kumimoji="0" lang="it-IT" sz="2400" b="0" i="0" u="none" strike="noStrike" kern="1200" cap="none" spc="0" normalizeH="0" baseline="0" noProof="0" dirty="0">
+                <a:ln>
+                  <a:noFill/>
+                </a:ln>
+                <a:effectLst/>
+                <a:uLnTx/>
+                <a:uFillTx/>
+                <a:latin typeface="Museo Sans Condensed" panose="02000000000000000000"/>
+                <a:ea typeface="+mn-ea"/>
+                <a:cs typeface="+mn-cs"/>
+              </a:rPr>
+              <a:t> </a:t>
+            </a:r>
+            <a:r>
+              <a:rPr kumimoji="0" lang="it-IT" sz="2400" b="0" i="0" u="none" strike="noStrike" kern="1200" cap="none" spc="0" normalizeH="0" baseline="0" noProof="0" dirty="0" err="1">
+                <a:ln>
+                  <a:noFill/>
+                </a:ln>
+                <a:effectLst/>
+                <a:uLnTx/>
+                <a:uFillTx/>
+                <a:latin typeface="Museo Sans Condensed" panose="02000000000000000000"/>
+                <a:ea typeface="+mn-ea"/>
+                <a:cs typeface="+mn-cs"/>
+              </a:rPr>
+              <a:t>Graph’s</a:t>
+            </a:r>
+            <a:r>
+              <a:rPr kumimoji="0" lang="it-IT" sz="2400" b="0" i="0" u="none" strike="noStrike" kern="1200" cap="none" spc="0" normalizeH="0" baseline="0" noProof="0" dirty="0">
+                <a:ln>
+                  <a:noFill/>
+                </a:ln>
+                <a:effectLst/>
+                <a:uLnTx/>
+                <a:uFillTx/>
+                <a:latin typeface="Museo Sans Condensed" panose="02000000000000000000"/>
+                <a:ea typeface="+mn-ea"/>
+                <a:cs typeface="+mn-cs"/>
+              </a:rPr>
+              <a:t> Communities?</a:t>
+            </a:r>
+          </a:p>
+        </p:txBody>
+      </p:sp>
+      <p:sp>
+        <p:nvSpPr>
+          <p:cNvPr id="9" name="TextBox 8">
+            <a:extLst>
+              <a:ext uri="{FF2B5EF4-FFF2-40B4-BE49-F238E27FC236}">
+                <a16:creationId xmlns:a16="http://schemas.microsoft.com/office/drawing/2014/main" id="{8B193ECB-6DE5-7893-F8E6-1835BBC8EF92}"/>
+              </a:ext>
+            </a:extLst>
+          </p:cNvPr>
+          <p:cNvSpPr txBox="1"/>
+          <p:nvPr/>
+        </p:nvSpPr>
+        <p:spPr>
+          <a:xfrm>
+            <a:off x="5191806" y="3838872"/>
+            <a:ext cx="7000194" cy="646331"/>
+          </a:xfrm>
+          <a:prstGeom prst="rect">
+            <a:avLst/>
+          </a:prstGeom>
+          <a:noFill/>
+        </p:spPr>
+        <p:txBody>
+          <a:bodyPr wrap="square">
+            <a:spAutoFit/>
+          </a:bodyPr>
+          <a:lstStyle/>
+          <a:p>
+            <a:r>
+              <a:rPr kumimoji="0" lang="en-US" sz="1800" b="0" i="0" u="none" strike="noStrike" kern="1200" cap="none" spc="0" normalizeH="0" baseline="0" noProof="0" dirty="0">
+                <a:ln>
+                  <a:noFill/>
+                </a:ln>
+                <a:effectLst/>
+                <a:uLnTx/>
+                <a:uFillTx/>
+                <a:latin typeface="Museo Sans"/>
+              </a:rPr>
+              <a:t>Common algorithms include Louvain's method, modularity maximization, Girvan-Newman algorithm, and Label Propagation algorithm.</a:t>
+            </a:r>
+            <a:endParaRPr lang="it-IT" dirty="0">
+              <a:latin typeface="Museo Sans"/>
+            </a:endParaRPr>
+          </a:p>
+        </p:txBody>
+      </p:sp>
+      <p:sp>
+        <p:nvSpPr>
+          <p:cNvPr id="10" name="TextBox 9">
+            <a:extLst>
+              <a:ext uri="{FF2B5EF4-FFF2-40B4-BE49-F238E27FC236}">
+                <a16:creationId xmlns:a16="http://schemas.microsoft.com/office/drawing/2014/main" id="{FB9A4A48-A04E-6ABF-D942-6E896C931472}"/>
+              </a:ext>
+            </a:extLst>
+          </p:cNvPr>
+          <p:cNvSpPr txBox="1"/>
+          <p:nvPr/>
+        </p:nvSpPr>
+        <p:spPr>
+          <a:xfrm>
+            <a:off x="427843" y="5277820"/>
+            <a:ext cx="1286657" cy="461665"/>
+          </a:xfrm>
+          <a:prstGeom prst="rect">
+            <a:avLst/>
+          </a:prstGeom>
+          <a:noFill/>
+        </p:spPr>
+        <p:txBody>
+          <a:bodyPr wrap="square" rtlCol="0">
+            <a:spAutoFit/>
+          </a:bodyPr>
+          <a:lstStyle/>
+          <a:p>
+            <a:pPr marL="0" marR="0" lvl="0" indent="0" algn="l" defTabSz="914400" rtl="0" eaLnBrk="1" fontAlgn="auto" latinLnBrk="0" hangingPunct="1">
+              <a:lnSpc>
+                <a:spcPct val="100000"/>
+              </a:lnSpc>
+              <a:spcBef>
+                <a:spcPts val="0"/>
+              </a:spcBef>
+              <a:spcAft>
+                <a:spcPts val="0"/>
+              </a:spcAft>
+              <a:buClrTx/>
+              <a:buSzTx/>
+              <a:buFontTx/>
+              <a:buNone/>
+              <a:tabLst/>
+              <a:defRPr/>
+            </a:pPr>
+            <a:r>
+              <a:rPr kumimoji="0" lang="it-IT" sz="2400" b="0" i="0" u="none" strike="noStrike" kern="1200" cap="none" spc="0" normalizeH="0" baseline="0" noProof="0" dirty="0">
+                <a:ln>
+                  <a:noFill/>
+                </a:ln>
+                <a:effectLst/>
+                <a:uLnTx/>
+                <a:uFillTx/>
+                <a:latin typeface="Museo Sans Condensed" panose="02000000000000000000"/>
+                <a:ea typeface="+mn-ea"/>
+                <a:cs typeface="+mn-cs"/>
+              </a:rPr>
+              <a:t>Use Case</a:t>
+            </a:r>
+          </a:p>
+        </p:txBody>
+      </p:sp>
+    </p:spTree>
+    <p:extLst>
+      <p:ext uri="{BB962C8B-B14F-4D97-AF65-F5344CB8AC3E}">
+        <p14:creationId xmlns:p14="http://schemas.microsoft.com/office/powerpoint/2010/main" val="2949155999"/>
+      </p:ext>
+    </p:extLst>
+  </p:cSld>
+  <p:clrMapOvr>
+    <a:masterClrMapping/>
+  </p:clrMapOvr>
+</p:sld>
+</file>
+
+<file path=ppt/slides/slide4.xml><?xml version="1.0" encoding="utf-8"?>
 <p:sld xmlns:a="http://schemas.openxmlformats.org/drawingml/2006/main" xmlns:r="http://schemas.openxmlformats.org/officeDocument/2006/relationships" xmlns:p="http://schemas.openxmlformats.org/presentationml/2006/main">
   <p:cSld>
     <p:spTree>
@@ -4564,10 +5215,10 @@
       </p:grpSpPr>
       <p:sp>
         <p:nvSpPr>
-          <p:cNvPr id="4" name="TextBox 3">
-            <a:extLst>
-              <a:ext uri="{FF2B5EF4-FFF2-40B4-BE49-F238E27FC236}">
-                <a16:creationId xmlns:a16="http://schemas.microsoft.com/office/drawing/2014/main" id="{5C826AB2-3C46-7C61-7717-6E78C3B4D762}"/>
+          <p:cNvPr id="3" name="TextBox 2">
+            <a:extLst>
+              <a:ext uri="{FF2B5EF4-FFF2-40B4-BE49-F238E27FC236}">
+                <a16:creationId xmlns:a16="http://schemas.microsoft.com/office/drawing/2014/main" id="{2602EF79-37DE-96CB-63A5-2922A0AE7BDB}"/>
               </a:ext>
             </a:extLst>
           </p:cNvPr>
@@ -4576,8 +5227,8 @@
         </p:nvSpPr>
         <p:spPr>
           <a:xfrm>
-            <a:off x="3655459" y="233562"/>
-            <a:ext cx="4451677" cy="646331"/>
+            <a:off x="3145871" y="201130"/>
+            <a:ext cx="5234731" cy="646331"/>
           </a:xfrm>
           <a:prstGeom prst="rect">
             <a:avLst/>
@@ -4590,7 +5241,7 @@
           </a:bodyPr>
           <a:lstStyle/>
           <a:p>
-            <a:pPr marL="0" marR="0" lvl="0" indent="0" algn="l" defTabSz="914400" rtl="0" eaLnBrk="1" fontAlgn="auto" latinLnBrk="0" hangingPunct="1">
+            <a:pPr marL="0" marR="0" lvl="0" indent="0" algn="ctr" defTabSz="914400" rtl="0" eaLnBrk="1" fontAlgn="auto" latinLnBrk="0" hangingPunct="1">
               <a:lnSpc>
                 <a:spcPct val="100000"/>
               </a:lnSpc>
@@ -4619,7 +5270,7 @@
                 <a:ea typeface="+mn-ea"/>
                 <a:cs typeface="+mn-cs"/>
               </a:rPr>
-              <a:t>A Community </a:t>
+              <a:t>A General Model </a:t>
             </a:r>
             <a:r>
               <a:rPr kumimoji="0" lang="it-IT" sz="3600" b="0" i="0" u="none" strike="noStrike" kern="1200" cap="none" spc="0" normalizeH="0" baseline="0" noProof="0" dirty="0" err="1">
@@ -4654,7 +5305,7 @@
           <p:cNvPr id="2" name="TextBox 1">
             <a:extLst>
               <a:ext uri="{FF2B5EF4-FFF2-40B4-BE49-F238E27FC236}">
-                <a16:creationId xmlns:a16="http://schemas.microsoft.com/office/drawing/2014/main" id="{80DAD55C-AF5F-0FA1-C795-C5DA7237A314}"/>
+                <a16:creationId xmlns:a16="http://schemas.microsoft.com/office/drawing/2014/main" id="{429E0E3E-2A0E-1407-1452-AD7F207BAECC}"/>
               </a:ext>
             </a:extLst>
           </p:cNvPr>
@@ -4663,8 +5314,8 @@
         </p:nvSpPr>
         <p:spPr>
           <a:xfrm>
-            <a:off x="427844" y="1349347"/>
-            <a:ext cx="4152320" cy="461665"/>
+            <a:off x="180712" y="1061363"/>
+            <a:ext cx="5854118" cy="461665"/>
           </a:xfrm>
           <a:prstGeom prst="rect">
             <a:avLst/>
@@ -4677,7 +5328,7 @@
           </a:bodyPr>
           <a:lstStyle/>
           <a:p>
-            <a:pPr marL="0" marR="0" lvl="0" indent="0" algn="l" defTabSz="914400" rtl="0" eaLnBrk="1" fontAlgn="auto" latinLnBrk="0" hangingPunct="1">
+            <a:pPr marL="0" marR="0" lvl="0" indent="0" defTabSz="914400" rtl="0" eaLnBrk="1" fontAlgn="auto" latinLnBrk="0" hangingPunct="1">
               <a:lnSpc>
                 <a:spcPct val="100000"/>
               </a:lnSpc>
@@ -4695,6 +5346,20 @@
               <a:defRPr/>
             </a:pPr>
             <a:r>
+              <a:rPr kumimoji="0" lang="it-IT" sz="2400" b="0" i="0" u="none" strike="noStrike" kern="1200" cap="none" spc="0" normalizeH="0" baseline="0" noProof="0" dirty="0" err="1">
+                <a:ln>
+                  <a:noFill/>
+                </a:ln>
+                <a:effectLst/>
+                <a:uLnTx/>
+                <a:uFillTx/>
+                <a:latin typeface="Museo Sans Condensed" panose="02000000000000000000"/>
+                <a:ea typeface="+mn-ea"/>
+                <a:cs typeface="+mn-cs"/>
+              </a:rPr>
+              <a:t>Example</a:t>
+            </a:r>
+            <a:r>
               <a:rPr kumimoji="0" lang="it-IT" sz="2400" b="0" i="0" u="none" strike="noStrike" kern="1200" cap="none" spc="0" normalizeH="0" baseline="0" noProof="0" dirty="0">
                 <a:ln>
                   <a:noFill/>
@@ -4706,7 +5371,7 @@
                 <a:ea typeface="+mn-ea"/>
                 <a:cs typeface="+mn-cs"/>
               </a:rPr>
-              <a:t>Community </a:t>
+              <a:t>: SIR (</a:t>
             </a:r>
             <a:r>
               <a:rPr kumimoji="0" lang="it-IT" sz="2400" b="0" i="0" u="none" strike="noStrike" kern="1200" cap="none" spc="0" normalizeH="0" baseline="0" noProof="0" dirty="0" err="1">
@@ -4720,7 +5385,7 @@
                 <a:ea typeface="+mn-ea"/>
                 <a:cs typeface="+mn-cs"/>
               </a:rPr>
-              <a:t>Structure</a:t>
+              <a:t>Susceptible-Infected-Recovered</a:t>
             </a:r>
             <a:r>
               <a:rPr kumimoji="0" lang="it-IT" sz="2400" b="0" i="0" u="none" strike="noStrike" kern="1200" cap="none" spc="0" normalizeH="0" baseline="0" noProof="0" dirty="0">
@@ -4734,17 +5399,17 @@
                 <a:ea typeface="+mn-ea"/>
                 <a:cs typeface="+mn-cs"/>
               </a:rPr>
-              <a:t> Definition:</a:t>
-            </a:r>
-          </a:p>
-        </p:txBody>
-      </p:sp>
-      <p:sp>
-        <p:nvSpPr>
-          <p:cNvPr id="5" name="TextBox 4">
-            <a:extLst>
-              <a:ext uri="{FF2B5EF4-FFF2-40B4-BE49-F238E27FC236}">
-                <a16:creationId xmlns:a16="http://schemas.microsoft.com/office/drawing/2014/main" id="{FD3B8CFF-DD63-475D-4AD4-7786430943EE}"/>
+              <a:t>)</a:t>
+            </a:r>
+          </a:p>
+        </p:txBody>
+      </p:sp>
+      <p:sp>
+        <p:nvSpPr>
+          <p:cNvPr id="4" name="TextBox 3">
+            <a:extLst>
+              <a:ext uri="{FF2B5EF4-FFF2-40B4-BE49-F238E27FC236}">
+                <a16:creationId xmlns:a16="http://schemas.microsoft.com/office/drawing/2014/main" id="{CE1C71FD-49B1-6A20-8815-6784E2638C71}"/>
               </a:ext>
             </a:extLst>
           </p:cNvPr>
@@ -4753,8 +5418,8 @@
         </p:nvSpPr>
         <p:spPr>
           <a:xfrm>
-            <a:off x="4696506" y="1440509"/>
-            <a:ext cx="6094638" cy="646331"/>
+            <a:off x="180712" y="1781625"/>
+            <a:ext cx="11165048" cy="1938992"/>
           </a:xfrm>
           <a:prstGeom prst="rect">
             <a:avLst/>
@@ -4762,94 +5427,12 @@
           <a:noFill/>
         </p:spPr>
         <p:txBody>
-          <a:bodyPr wrap="square">
-            <a:spAutoFit/>
-          </a:bodyPr>
-          <a:lstStyle/>
-          <a:p>
-            <a:r>
-              <a:rPr kumimoji="0" lang="it-IT" sz="1800" b="0" i="0" u="none" strike="noStrike" kern="1200" cap="none" spc="0" normalizeH="0" baseline="0" noProof="0" dirty="0">
-                <a:ln>
-                  <a:noFill/>
-                </a:ln>
-                <a:effectLst/>
-                <a:uLnTx/>
-                <a:uFillTx/>
-                <a:latin typeface="Museo Sans"/>
-              </a:rPr>
-              <a:t>A subset of </a:t>
-            </a:r>
-            <a:r>
-              <a:rPr kumimoji="0" lang="it-IT" sz="1800" b="0" i="0" u="none" strike="noStrike" kern="1200" cap="none" spc="0" normalizeH="0" baseline="0" noProof="0" dirty="0" err="1">
-                <a:ln>
-                  <a:noFill/>
-                </a:ln>
-                <a:effectLst/>
-                <a:uLnTx/>
-                <a:uFillTx/>
-                <a:latin typeface="Museo Sans"/>
-              </a:rPr>
-              <a:t>nodes</a:t>
-            </a:r>
-            <a:r>
-              <a:rPr kumimoji="0" lang="it-IT" sz="1800" b="0" i="0" u="none" strike="noStrike" kern="1200" cap="none" spc="0" normalizeH="0" baseline="0" noProof="0" dirty="0">
-                <a:ln>
-                  <a:noFill/>
-                </a:ln>
-                <a:effectLst/>
-                <a:uLnTx/>
-                <a:uFillTx/>
-                <a:latin typeface="Museo Sans"/>
-              </a:rPr>
-              <a:t> </a:t>
-            </a:r>
-            <a:r>
-              <a:rPr kumimoji="0" lang="en-US" sz="1800" b="0" i="0" u="none" strike="noStrike" kern="1200" cap="none" spc="0" normalizeH="0" baseline="0" noProof="0" dirty="0">
-                <a:ln>
-                  <a:noFill/>
-                </a:ln>
-                <a:effectLst/>
-                <a:uLnTx/>
-                <a:uFillTx/>
-                <a:latin typeface="Museo Sans"/>
-              </a:rPr>
-              <a:t>who have a strong internal connection and a weaker connection with elements outside the community</a:t>
-            </a:r>
-            <a:endParaRPr lang="it-IT" dirty="0">
-              <a:latin typeface="Museo Sans"/>
-            </a:endParaRPr>
-          </a:p>
-        </p:txBody>
-      </p:sp>
-      <p:sp>
-        <p:nvSpPr>
-          <p:cNvPr id="6" name="TextBox 5">
-            <a:extLst>
-              <a:ext uri="{FF2B5EF4-FFF2-40B4-BE49-F238E27FC236}">
-                <a16:creationId xmlns:a16="http://schemas.microsoft.com/office/drawing/2014/main" id="{0E6D3760-F9DD-4E06-ABC2-47F532335ABC}"/>
-              </a:ext>
-            </a:extLst>
-          </p:cNvPr>
-          <p:cNvSpPr txBox="1"/>
-          <p:nvPr/>
-        </p:nvSpPr>
-        <p:spPr>
-          <a:xfrm>
-            <a:off x="427843" y="2557464"/>
-            <a:ext cx="3227615" cy="461665"/>
-          </a:xfrm>
-          <a:prstGeom prst="rect">
-            <a:avLst/>
-          </a:prstGeom>
-          <a:noFill/>
-        </p:spPr>
-        <p:txBody>
           <a:bodyPr wrap="square" rtlCol="0">
             <a:spAutoFit/>
           </a:bodyPr>
           <a:lstStyle/>
           <a:p>
-            <a:pPr marL="0" marR="0" lvl="0" indent="0" algn="l" defTabSz="914400" rtl="0" eaLnBrk="1" fontAlgn="auto" latinLnBrk="0" hangingPunct="1">
+            <a:pPr marL="0" marR="0" lvl="0" indent="0" defTabSz="914400" rtl="0" eaLnBrk="1" fontAlgn="auto" latinLnBrk="0" hangingPunct="1">
               <a:lnSpc>
                 <a:spcPct val="100000"/>
               </a:lnSpc>
@@ -4867,66 +5450,80 @@
               <a:defRPr/>
             </a:pPr>
             <a:r>
-              <a:rPr kumimoji="0" lang="it-IT" sz="2400" b="0" i="0" u="none" strike="noStrike" kern="1200" cap="none" spc="0" normalizeH="0" baseline="0" noProof="0" dirty="0" err="1">
-                <a:ln>
-                  <a:noFill/>
-                </a:ln>
-                <a:effectLst/>
-                <a:uLnTx/>
-                <a:uFillTx/>
+              <a:rPr lang="it-IT" sz="2400" dirty="0">
                 <a:latin typeface="Museo Sans Condensed" panose="02000000000000000000"/>
-                <a:ea typeface="+mn-ea"/>
-                <a:cs typeface="+mn-cs"/>
-              </a:rPr>
-              <a:t>Why</a:t>
-            </a:r>
-            <a:r>
-              <a:rPr kumimoji="0" lang="it-IT" sz="2400" b="0" i="0" u="none" strike="noStrike" kern="1200" cap="none" spc="0" normalizeH="0" baseline="0" noProof="0" dirty="0">
-                <a:ln>
-                  <a:noFill/>
-                </a:ln>
-                <a:effectLst/>
-                <a:uLnTx/>
-                <a:uFillTx/>
+              </a:rPr>
+              <a:t>The SIR Model divide the </a:t>
+            </a:r>
+            <a:r>
+              <a:rPr lang="it-IT" sz="2400" dirty="0" err="1">
                 <a:latin typeface="Museo Sans Condensed" panose="02000000000000000000"/>
-                <a:ea typeface="+mn-ea"/>
-                <a:cs typeface="+mn-cs"/>
-              </a:rPr>
-              <a:t>?</a:t>
-            </a:r>
-          </a:p>
-        </p:txBody>
-      </p:sp>
-      <p:sp>
-        <p:nvSpPr>
-          <p:cNvPr id="7" name="TextBox 6">
-            <a:extLst>
-              <a:ext uri="{FF2B5EF4-FFF2-40B4-BE49-F238E27FC236}">
-                <a16:creationId xmlns:a16="http://schemas.microsoft.com/office/drawing/2014/main" id="{22A29129-98A4-A465-7CED-465253C89CAA}"/>
-              </a:ext>
-            </a:extLst>
-          </p:cNvPr>
-          <p:cNvSpPr txBox="1"/>
-          <p:nvPr/>
-        </p:nvSpPr>
-        <p:spPr>
-          <a:xfrm>
-            <a:off x="1248455" y="2592751"/>
-            <a:ext cx="6736216" cy="646331"/>
-          </a:xfrm>
-          <a:prstGeom prst="rect">
-            <a:avLst/>
-          </a:prstGeom>
-          <a:noFill/>
-        </p:spPr>
-        <p:txBody>
-          <a:bodyPr wrap="square">
-            <a:spAutoFit/>
-          </a:bodyPr>
-          <a:lstStyle/>
-          <a:p>
-            <a:r>
-              <a:rPr kumimoji="0" lang="en-US" sz="1800" b="0" i="0" u="none" strike="noStrike" kern="1200" cap="none" spc="0" normalizeH="0" baseline="0" noProof="0" dirty="0">
+              </a:rPr>
+              <a:t>population</a:t>
+            </a:r>
+            <a:r>
+              <a:rPr lang="it-IT" sz="2400" dirty="0">
+                <a:latin typeface="Museo Sans Condensed" panose="02000000000000000000"/>
+              </a:rPr>
+              <a:t> (</a:t>
+            </a:r>
+            <a:r>
+              <a:rPr lang="it-IT" sz="2400" dirty="0" err="1">
+                <a:latin typeface="Museo Sans Condensed" panose="02000000000000000000"/>
+              </a:rPr>
+              <a:t>nodes</a:t>
+            </a:r>
+            <a:r>
+              <a:rPr lang="it-IT" sz="2400" dirty="0">
+                <a:latin typeface="Museo Sans Condensed" panose="02000000000000000000"/>
+              </a:rPr>
+              <a:t>) </a:t>
+            </a:r>
+            <a:r>
+              <a:rPr lang="it-IT" sz="2400" dirty="0" err="1">
+                <a:latin typeface="Museo Sans Condensed" panose="02000000000000000000"/>
+              </a:rPr>
+              <a:t>into</a:t>
+            </a:r>
+            <a:r>
+              <a:rPr lang="it-IT" sz="2400" dirty="0">
+                <a:latin typeface="Museo Sans Condensed" panose="02000000000000000000"/>
+              </a:rPr>
+              <a:t> 3 </a:t>
+            </a:r>
+            <a:r>
+              <a:rPr lang="it-IT" sz="2400" dirty="0" err="1">
+                <a:latin typeface="Museo Sans Condensed" panose="02000000000000000000"/>
+              </a:rPr>
+              <a:t>categories</a:t>
+            </a:r>
+            <a:r>
+              <a:rPr lang="it-IT" sz="2400" dirty="0">
+                <a:latin typeface="Museo Sans Condensed" panose="02000000000000000000"/>
+              </a:rPr>
+              <a:t>: </a:t>
+            </a:r>
+          </a:p>
+          <a:p>
+            <a:pPr marL="342900" marR="0" lvl="0" indent="-342900" defTabSz="914400" rtl="0" eaLnBrk="1" fontAlgn="auto" latinLnBrk="0" hangingPunct="1">
+              <a:lnSpc>
+                <a:spcPct val="100000"/>
+              </a:lnSpc>
+              <a:spcBef>
+                <a:spcPts val="0"/>
+              </a:spcBef>
+              <a:spcAft>
+                <a:spcPts val="0"/>
+              </a:spcAft>
+              <a:buClrTx/>
+              <a:buSzTx/>
+              <a:buFont typeface="Arial" panose="020B0604020202020204" pitchFamily="34" charset="0"/>
+              <a:buChar char="•"/>
+              <a:tabLst/>
+              <a:defRPr/>
+            </a:pPr>
+            <a:r>
+              <a:rPr kumimoji="0" lang="it-IT" sz="2400" b="1" i="0" u="none" strike="noStrike" kern="1200" cap="none" spc="0" normalizeH="0" baseline="0" noProof="0" dirty="0" err="1">
                 <a:ln>
                   <a:noFill/>
                 </a:ln>
@@ -4935,20 +5532,178 @@
                 <a:uFillTx/>
                 <a:latin typeface="Museo Sans"/>
               </a:rPr>
-              <a:t>Identify groups of nodes with similar relationships or interactions to understand the structure and functionality of the graph.</a:t>
-            </a:r>
-            <a:endParaRPr lang="it-IT" dirty="0">
+              <a:t>Susceptible</a:t>
+            </a:r>
+            <a:r>
+              <a:rPr kumimoji="0" lang="it-IT" sz="2400" b="1" i="0" u="none" strike="noStrike" kern="1200" cap="none" spc="0" normalizeH="0" baseline="0" noProof="0" dirty="0">
+                <a:ln>
+                  <a:noFill/>
+                </a:ln>
+                <a:effectLst/>
+                <a:uLnTx/>
+                <a:uFillTx/>
+                <a:latin typeface="Museo Sans"/>
+              </a:rPr>
+              <a:t> (S): </a:t>
+            </a:r>
+            <a:r>
+              <a:rPr kumimoji="0" lang="en-US" sz="2400" b="0" i="0" u="none" strike="noStrike" kern="1200" cap="none" spc="0" normalizeH="0" baseline="0" noProof="0" dirty="0">
+                <a:ln>
+                  <a:noFill/>
+                </a:ln>
+                <a:effectLst/>
+                <a:uLnTx/>
+                <a:uFillTx/>
+                <a:latin typeface="Museo Sans"/>
+              </a:rPr>
+              <a:t>Individuals who can become infected</a:t>
+            </a:r>
+            <a:endParaRPr kumimoji="0" lang="it-IT" sz="2400" b="0" i="0" u="none" strike="noStrike" kern="1200" cap="none" spc="0" normalizeH="0" baseline="0" noProof="0" dirty="0">
+              <a:ln>
+                <a:noFill/>
+              </a:ln>
+              <a:effectLst/>
+              <a:uLnTx/>
+              <a:uFillTx/>
               <a:latin typeface="Museo Sans"/>
             </a:endParaRPr>
           </a:p>
-        </p:txBody>
-      </p:sp>
-      <p:sp>
-        <p:nvSpPr>
-          <p:cNvPr id="8" name="TextBox 7">
-            <a:extLst>
-              <a:ext uri="{FF2B5EF4-FFF2-40B4-BE49-F238E27FC236}">
-                <a16:creationId xmlns:a16="http://schemas.microsoft.com/office/drawing/2014/main" id="{3CB6434C-F915-5351-B9F9-2D2D72BDCE7E}"/>
+          <a:p>
+            <a:pPr marL="342900" marR="0" lvl="0" indent="-342900" defTabSz="914400" rtl="0" eaLnBrk="1" fontAlgn="auto" latinLnBrk="0" hangingPunct="1">
+              <a:lnSpc>
+                <a:spcPct val="100000"/>
+              </a:lnSpc>
+              <a:spcBef>
+                <a:spcPts val="0"/>
+              </a:spcBef>
+              <a:spcAft>
+                <a:spcPts val="0"/>
+              </a:spcAft>
+              <a:buClrTx/>
+              <a:buSzTx/>
+              <a:buFont typeface="Arial" panose="020B0604020202020204" pitchFamily="34" charset="0"/>
+              <a:buChar char="•"/>
+              <a:tabLst/>
+              <a:defRPr/>
+            </a:pPr>
+            <a:r>
+              <a:rPr lang="it-IT" sz="2400" b="1" dirty="0" err="1">
+                <a:latin typeface="Museo Sans"/>
+              </a:rPr>
+              <a:t>Infected</a:t>
+            </a:r>
+            <a:r>
+              <a:rPr lang="it-IT" sz="2400" b="1" dirty="0">
+                <a:latin typeface="Museo Sans"/>
+              </a:rPr>
+              <a:t> (I): </a:t>
+            </a:r>
+            <a:r>
+              <a:rPr lang="en-US" sz="2400" b="1" dirty="0">
+                <a:latin typeface="Museo Sans"/>
+              </a:rPr>
+              <a:t> </a:t>
+            </a:r>
+            <a:r>
+              <a:rPr lang="en-US" sz="2400" dirty="0">
+                <a:latin typeface="Museo Sans"/>
+              </a:rPr>
+              <a:t>Individuals who have contracted the infection and can transmit it.</a:t>
+            </a:r>
+            <a:endParaRPr lang="it-IT" sz="2400" dirty="0">
+              <a:latin typeface="Museo Sans"/>
+            </a:endParaRPr>
+          </a:p>
+          <a:p>
+            <a:pPr marL="342900" marR="0" lvl="0" indent="-342900" defTabSz="914400" rtl="0" eaLnBrk="1" fontAlgn="auto" latinLnBrk="0" hangingPunct="1">
+              <a:lnSpc>
+                <a:spcPct val="100000"/>
+              </a:lnSpc>
+              <a:spcBef>
+                <a:spcPts val="0"/>
+              </a:spcBef>
+              <a:spcAft>
+                <a:spcPts val="0"/>
+              </a:spcAft>
+              <a:buClrTx/>
+              <a:buSzTx/>
+              <a:buFont typeface="Arial" panose="020B0604020202020204" pitchFamily="34" charset="0"/>
+              <a:buChar char="•"/>
+              <a:tabLst/>
+              <a:defRPr/>
+            </a:pPr>
+            <a:r>
+              <a:rPr kumimoji="0" lang="it-IT" sz="2400" b="1" i="0" u="none" strike="noStrike" kern="1200" cap="none" spc="0" normalizeH="0" baseline="0" noProof="0" dirty="0" err="1">
+                <a:ln>
+                  <a:noFill/>
+                </a:ln>
+                <a:effectLst/>
+                <a:uLnTx/>
+                <a:uFillTx/>
+                <a:latin typeface="Museo Sans"/>
+              </a:rPr>
+              <a:t>Recovered</a:t>
+            </a:r>
+            <a:r>
+              <a:rPr kumimoji="0" lang="it-IT" sz="2400" b="1" i="0" u="none" strike="noStrike" kern="1200" cap="none" spc="0" normalizeH="0" baseline="0" noProof="0" dirty="0">
+                <a:ln>
+                  <a:noFill/>
+                </a:ln>
+                <a:effectLst/>
+                <a:uLnTx/>
+                <a:uFillTx/>
+                <a:latin typeface="Museo Sans"/>
+              </a:rPr>
+              <a:t> (R): </a:t>
+            </a:r>
+            <a:r>
+              <a:rPr lang="en-US" sz="2400" dirty="0">
+                <a:latin typeface="Museo Sans"/>
+              </a:rPr>
+              <a:t>I</a:t>
+            </a:r>
+            <a:r>
+              <a:rPr kumimoji="0" lang="en-US" sz="2400" b="0" i="0" u="none" strike="noStrike" kern="1200" cap="none" spc="0" normalizeH="0" baseline="0" noProof="0" dirty="0" err="1">
+                <a:ln>
+                  <a:noFill/>
+                </a:ln>
+                <a:effectLst/>
+                <a:uLnTx/>
+                <a:uFillTx/>
+                <a:latin typeface="Museo Sans"/>
+              </a:rPr>
+              <a:t>ndividuals</a:t>
+            </a:r>
+            <a:r>
+              <a:rPr kumimoji="0" lang="en-US" sz="2400" b="0" i="0" u="none" strike="noStrike" kern="1200" cap="none" spc="0" normalizeH="0" baseline="0" noProof="0" dirty="0">
+                <a:ln>
+                  <a:noFill/>
+                </a:ln>
+                <a:effectLst/>
+                <a:uLnTx/>
+                <a:uFillTx/>
+                <a:latin typeface="Museo Sans"/>
+              </a:rPr>
+              <a:t> who have recovered from the infection and can no longer transmit or contract it.</a:t>
+            </a:r>
+            <a:endParaRPr kumimoji="0" lang="it-IT" sz="2400" b="0" i="0" u="none" strike="noStrike" kern="1200" cap="none" spc="0" normalizeH="0" baseline="0" noProof="0" dirty="0">
+              <a:ln>
+                <a:noFill/>
+              </a:ln>
+              <a:effectLst/>
+              <a:uLnTx/>
+              <a:uFillTx/>
+              <a:latin typeface="Museo Sans"/>
+            </a:endParaRPr>
+          </a:p>
+        </p:txBody>
+      </p:sp>
+      <p:sp>
+        <p:nvSpPr>
+          <p:cNvPr id="5" name="TextBox 4">
+            <a:extLst>
+              <a:ext uri="{FF2B5EF4-FFF2-40B4-BE49-F238E27FC236}">
+                <a16:creationId xmlns:a16="http://schemas.microsoft.com/office/drawing/2014/main" id="{AA6E4E3B-2251-F795-CF18-67293A55E213}"/>
               </a:ext>
             </a:extLst>
           </p:cNvPr>
@@ -4957,8 +5712,8 @@
         </p:nvSpPr>
         <p:spPr>
           <a:xfrm>
-            <a:off x="427843" y="3838872"/>
-            <a:ext cx="4993243" cy="461665"/>
+            <a:off x="180712" y="3979214"/>
+            <a:ext cx="7066378" cy="2554545"/>
           </a:xfrm>
           <a:prstGeom prst="rect">
             <a:avLst/>
@@ -4971,7 +5726,7 @@
           </a:bodyPr>
           <a:lstStyle/>
           <a:p>
-            <a:pPr marL="0" marR="0" lvl="0" indent="0" algn="l" defTabSz="914400" rtl="0" eaLnBrk="1" fontAlgn="auto" latinLnBrk="0" hangingPunct="1">
+            <a:pPr marL="0" marR="0" lvl="0" indent="0" defTabSz="914400" rtl="0" eaLnBrk="1" fontAlgn="auto" latinLnBrk="0" hangingPunct="1">
               <a:lnSpc>
                 <a:spcPct val="100000"/>
               </a:lnSpc>
@@ -4989,114 +5744,80 @@
               <a:defRPr/>
             </a:pPr>
             <a:r>
-              <a:rPr kumimoji="0" lang="it-IT" sz="2400" b="0" i="0" u="none" strike="noStrike" kern="1200" cap="none" spc="0" normalizeH="0" baseline="0" noProof="0" dirty="0">
-                <a:ln>
-                  <a:noFill/>
-                </a:ln>
-                <a:effectLst/>
-                <a:uLnTx/>
-                <a:uFillTx/>
+              <a:rPr lang="it-IT" sz="2000" dirty="0">
                 <a:latin typeface="Museo Sans Condensed" panose="02000000000000000000"/>
-                <a:ea typeface="+mn-ea"/>
-                <a:cs typeface="+mn-cs"/>
-              </a:rPr>
-              <a:t>How to </a:t>
-            </a:r>
-            <a:r>
-              <a:rPr lang="it-IT" sz="2400" dirty="0">
+              </a:rPr>
+              <a:t>The SIR Model divide the </a:t>
+            </a:r>
+            <a:r>
+              <a:rPr lang="it-IT" sz="2000" dirty="0" err="1">
                 <a:latin typeface="Museo Sans Condensed" panose="02000000000000000000"/>
               </a:rPr>
-              <a:t>i</a:t>
-            </a:r>
-            <a:r>
-              <a:rPr kumimoji="0" lang="it-IT" sz="2400" b="0" i="0" u="none" strike="noStrike" kern="1200" cap="none" spc="0" normalizeH="0" baseline="0" noProof="0" dirty="0" err="1">
-                <a:ln>
-                  <a:noFill/>
-                </a:ln>
-                <a:effectLst/>
-                <a:uLnTx/>
-                <a:uFillTx/>
+              <a:t>population</a:t>
+            </a:r>
+            <a:r>
+              <a:rPr lang="it-IT" sz="2000" dirty="0">
                 <a:latin typeface="Museo Sans Condensed" panose="02000000000000000000"/>
-                <a:ea typeface="+mn-ea"/>
-                <a:cs typeface="+mn-cs"/>
-              </a:rPr>
-              <a:t>dentify</a:t>
-            </a:r>
-            <a:r>
-              <a:rPr kumimoji="0" lang="it-IT" sz="2400" b="0" i="0" u="none" strike="noStrike" kern="1200" cap="none" spc="0" normalizeH="0" baseline="0" noProof="0" dirty="0">
-                <a:ln>
-                  <a:noFill/>
-                </a:ln>
-                <a:effectLst/>
-                <a:uLnTx/>
-                <a:uFillTx/>
+              </a:rPr>
+              <a:t> (</a:t>
+            </a:r>
+            <a:r>
+              <a:rPr lang="it-IT" sz="2000" dirty="0" err="1">
                 <a:latin typeface="Museo Sans Condensed" panose="02000000000000000000"/>
-                <a:ea typeface="+mn-ea"/>
-                <a:cs typeface="+mn-cs"/>
-              </a:rPr>
-              <a:t> </a:t>
-            </a:r>
-            <a:r>
-              <a:rPr kumimoji="0" lang="it-IT" sz="2400" b="0" i="0" u="none" strike="noStrike" kern="1200" cap="none" spc="0" normalizeH="0" baseline="0" noProof="0" dirty="0" err="1">
-                <a:ln>
-                  <a:noFill/>
-                </a:ln>
-                <a:effectLst/>
-                <a:uLnTx/>
-                <a:uFillTx/>
+              </a:rPr>
+              <a:t>nodes</a:t>
+            </a:r>
+            <a:r>
+              <a:rPr lang="it-IT" sz="2000" dirty="0">
                 <a:latin typeface="Museo Sans Condensed" panose="02000000000000000000"/>
-                <a:ea typeface="+mn-ea"/>
-                <a:cs typeface="+mn-cs"/>
-              </a:rPr>
-              <a:t>Graph’s</a:t>
-            </a:r>
-            <a:r>
-              <a:rPr kumimoji="0" lang="it-IT" sz="2400" b="0" i="0" u="none" strike="noStrike" kern="1200" cap="none" spc="0" normalizeH="0" baseline="0" noProof="0" dirty="0">
-                <a:ln>
-                  <a:noFill/>
-                </a:ln>
-                <a:effectLst/>
-                <a:uLnTx/>
-                <a:uFillTx/>
+              </a:rPr>
+              <a:t>) </a:t>
+            </a:r>
+            <a:r>
+              <a:rPr lang="it-IT" sz="2000" dirty="0" err="1">
                 <a:latin typeface="Museo Sans Condensed" panose="02000000000000000000"/>
-                <a:ea typeface="+mn-ea"/>
-                <a:cs typeface="+mn-cs"/>
-              </a:rPr>
-              <a:t> Communities?</a:t>
-            </a:r>
-          </a:p>
-        </p:txBody>
-      </p:sp>
-      <p:sp>
-        <p:nvSpPr>
-          <p:cNvPr id="9" name="TextBox 8">
-            <a:extLst>
-              <a:ext uri="{FF2B5EF4-FFF2-40B4-BE49-F238E27FC236}">
-                <a16:creationId xmlns:a16="http://schemas.microsoft.com/office/drawing/2014/main" id="{8B193ECB-6DE5-7893-F8E6-1835BBC8EF92}"/>
-              </a:ext>
-            </a:extLst>
-          </p:cNvPr>
-          <p:cNvSpPr txBox="1"/>
-          <p:nvPr/>
-        </p:nvSpPr>
-        <p:spPr>
-          <a:xfrm>
-            <a:off x="5191806" y="3838872"/>
-            <a:ext cx="7000194" cy="646331"/>
-          </a:xfrm>
-          <a:prstGeom prst="rect">
-            <a:avLst/>
-          </a:prstGeom>
-          <a:noFill/>
-        </p:spPr>
-        <p:txBody>
-          <a:bodyPr wrap="square">
-            <a:spAutoFit/>
-          </a:bodyPr>
-          <a:lstStyle/>
-          <a:p>
-            <a:r>
-              <a:rPr kumimoji="0" lang="en-US" sz="1800" b="0" i="0" u="none" strike="noStrike" kern="1200" cap="none" spc="0" normalizeH="0" baseline="0" noProof="0" dirty="0">
+              </a:rPr>
+              <a:t>into</a:t>
+            </a:r>
+            <a:r>
+              <a:rPr lang="it-IT" sz="2000" dirty="0">
+                <a:latin typeface="Museo Sans Condensed" panose="02000000000000000000"/>
+              </a:rPr>
+              <a:t> 3 </a:t>
+            </a:r>
+            <a:r>
+              <a:rPr lang="it-IT" sz="2000" dirty="0" err="1">
+                <a:latin typeface="Museo Sans Condensed" panose="02000000000000000000"/>
+              </a:rPr>
+              <a:t>categories</a:t>
+            </a:r>
+            <a:r>
+              <a:rPr lang="it-IT" sz="2000" dirty="0">
+                <a:latin typeface="Museo Sans Condensed" panose="02000000000000000000"/>
+              </a:rPr>
+              <a:t>: </a:t>
+            </a:r>
+          </a:p>
+          <a:p>
+            <a:pPr marL="342900" marR="0" lvl="0" indent="-342900" defTabSz="914400" rtl="0" eaLnBrk="1" fontAlgn="auto" latinLnBrk="0" hangingPunct="1">
+              <a:lnSpc>
+                <a:spcPct val="100000"/>
+              </a:lnSpc>
+              <a:spcBef>
+                <a:spcPts val="0"/>
+              </a:spcBef>
+              <a:spcAft>
+                <a:spcPts val="0"/>
+              </a:spcAft>
+              <a:buClrTx/>
+              <a:buSzTx/>
+              <a:buFont typeface="Arial" panose="020B0604020202020204" pitchFamily="34" charset="0"/>
+              <a:buChar char="•"/>
+              <a:tabLst/>
+              <a:defRPr/>
+            </a:pPr>
+            <a:r>
+              <a:rPr kumimoji="0" lang="en-US" sz="2000" b="1" i="0" u="none" strike="noStrike" kern="1200" cap="none" spc="0" normalizeH="0" baseline="0" noProof="0" dirty="0">
                 <a:ln>
                   <a:noFill/>
                 </a:ln>
@@ -5105,20 +5826,220 @@
                 <a:uFillTx/>
                 <a:latin typeface="Museo Sans"/>
               </a:rPr>
-              <a:t>Common algorithms include Louvain's method, modularity maximization, Girvan-Newman algorithm, and Label Propagation algorithm.</a:t>
-            </a:r>
-            <a:endParaRPr lang="it-IT" dirty="0">
+              <a:t>beta (β): </a:t>
+            </a:r>
+            <a:r>
+              <a:rPr kumimoji="0" lang="en-US" sz="2000" b="0" i="0" u="none" strike="noStrike" kern="1200" cap="none" spc="0" normalizeH="0" baseline="0" noProof="0" dirty="0">
+                <a:ln>
+                  <a:noFill/>
+                </a:ln>
+                <a:effectLst/>
+                <a:uLnTx/>
+                <a:uFillTx/>
+                <a:latin typeface="Museo Sans"/>
+              </a:rPr>
+              <a:t>transmission rate, i.e., the probability that contact between a susceptible individual and an infected one will lead to transmission of the infection.</a:t>
+            </a:r>
+            <a:r>
+              <a:rPr lang="it-IT" sz="2000" dirty="0">
+                <a:latin typeface="Museo Sans"/>
+              </a:rPr>
+              <a:t> </a:t>
+            </a:r>
+          </a:p>
+          <a:p>
+            <a:pPr marL="342900" marR="0" lvl="0" indent="-342900" defTabSz="914400" rtl="0" eaLnBrk="1" fontAlgn="auto" latinLnBrk="0" hangingPunct="1">
+              <a:lnSpc>
+                <a:spcPct val="100000"/>
+              </a:lnSpc>
+              <a:spcBef>
+                <a:spcPts val="0"/>
+              </a:spcBef>
+              <a:spcAft>
+                <a:spcPts val="0"/>
+              </a:spcAft>
+              <a:buClrTx/>
+              <a:buSzTx/>
+              <a:buFont typeface="Arial" panose="020B0604020202020204" pitchFamily="34" charset="0"/>
+              <a:buChar char="•"/>
+              <a:tabLst/>
+              <a:defRPr/>
+            </a:pPr>
+            <a:r>
+              <a:rPr lang="en-US" sz="2000" b="1" dirty="0">
+                <a:latin typeface="Museo Sans"/>
+              </a:rPr>
+              <a:t>gamma (γ): </a:t>
+            </a:r>
+            <a:r>
+              <a:rPr lang="en-US" sz="2000" dirty="0">
+                <a:latin typeface="Museo Sans"/>
+              </a:rPr>
+              <a:t>recovery rate, i.e., the probability that an infected individual will recover and move to the recovered state.</a:t>
+            </a:r>
+          </a:p>
+          <a:p>
+            <a:pPr marL="342900" marR="0" lvl="0" indent="-342900" defTabSz="914400" rtl="0" eaLnBrk="1" fontAlgn="auto" latinLnBrk="0" hangingPunct="1">
+              <a:lnSpc>
+                <a:spcPct val="100000"/>
+              </a:lnSpc>
+              <a:spcBef>
+                <a:spcPts val="0"/>
+              </a:spcBef>
+              <a:spcAft>
+                <a:spcPts val="0"/>
+              </a:spcAft>
+              <a:buClrTx/>
+              <a:buSzTx/>
+              <a:buFont typeface="Arial" panose="020B0604020202020204" pitchFamily="34" charset="0"/>
+              <a:buChar char="•"/>
+              <a:tabLst/>
+              <a:defRPr/>
+            </a:pPr>
+            <a:r>
+              <a:rPr lang="en-US" sz="2000" dirty="0">
+                <a:latin typeface="Museo Sans"/>
+              </a:rPr>
+              <a:t>(</a:t>
+            </a:r>
+            <a:r>
+              <a:rPr lang="en-US" sz="2000" i="1" dirty="0">
+                <a:latin typeface="Museo Sans"/>
+              </a:rPr>
+              <a:t>Optional</a:t>
+            </a:r>
+            <a:r>
+              <a:rPr lang="en-US" sz="2000" dirty="0">
+                <a:latin typeface="Museo Sans"/>
+              </a:rPr>
+              <a:t>) </a:t>
+            </a:r>
+            <a:r>
+              <a:rPr lang="en-US" sz="2000" b="1" dirty="0" err="1">
+                <a:latin typeface="Museo Sans"/>
+              </a:rPr>
+              <a:t>percentage_infected</a:t>
+            </a:r>
+            <a:r>
+              <a:rPr lang="en-US" sz="2000" b="1" dirty="0">
+                <a:latin typeface="Museo Sans"/>
+              </a:rPr>
+              <a:t>: </a:t>
+            </a:r>
+            <a:r>
+              <a:rPr lang="en-US" sz="2000" dirty="0">
+                <a:latin typeface="Museo Sans"/>
+              </a:rPr>
+              <a:t>Initial percentage of infected nodes (a list of initial infected nodes can also be specified).</a:t>
+            </a:r>
+            <a:endParaRPr lang="it-IT" sz="2000" dirty="0">
               <a:latin typeface="Museo Sans"/>
             </a:endParaRPr>
           </a:p>
         </p:txBody>
       </p:sp>
-      <p:sp>
-        <p:nvSpPr>
-          <p:cNvPr id="10" name="TextBox 9">
-            <a:extLst>
-              <a:ext uri="{FF2B5EF4-FFF2-40B4-BE49-F238E27FC236}">
-                <a16:creationId xmlns:a16="http://schemas.microsoft.com/office/drawing/2014/main" id="{FB9A4A48-A04E-6ABF-D942-6E896C931472}"/>
+      <p:pic>
+        <p:nvPicPr>
+          <p:cNvPr id="11" name="Picture 10">
+            <a:extLst>
+              <a:ext uri="{FF2B5EF4-FFF2-40B4-BE49-F238E27FC236}">
+                <a16:creationId xmlns:a16="http://schemas.microsoft.com/office/drawing/2014/main" id="{CA3AAA2F-F059-910F-42A4-74250D3A6A79}"/>
+              </a:ext>
+            </a:extLst>
+          </p:cNvPr>
+          <p:cNvPicPr>
+            <a:picLocks noChangeAspect="1"/>
+          </p:cNvPicPr>
+          <p:nvPr/>
+        </p:nvPicPr>
+        <p:blipFill>
+          <a:blip r:embed="rId2"/>
+          <a:stretch>
+            <a:fillRect/>
+          </a:stretch>
+        </p:blipFill>
+        <p:spPr>
+          <a:xfrm>
+            <a:off x="9003037" y="1061363"/>
+            <a:ext cx="2149145" cy="1228083"/>
+          </a:xfrm>
+          <a:prstGeom prst="rect">
+            <a:avLst/>
+          </a:prstGeom>
+        </p:spPr>
+      </p:pic>
+      <p:pic>
+        <p:nvPicPr>
+          <p:cNvPr id="13" name="Picture 12">
+            <a:extLst>
+              <a:ext uri="{FF2B5EF4-FFF2-40B4-BE49-F238E27FC236}">
+                <a16:creationId xmlns:a16="http://schemas.microsoft.com/office/drawing/2014/main" id="{BEE0CD99-925D-F1E4-53D8-9D4E17BFABD6}"/>
+              </a:ext>
+            </a:extLst>
+          </p:cNvPr>
+          <p:cNvPicPr>
+            <a:picLocks noChangeAspect="1"/>
+          </p:cNvPicPr>
+          <p:nvPr/>
+        </p:nvPicPr>
+        <p:blipFill>
+          <a:blip r:embed="rId3"/>
+          <a:stretch>
+            <a:fillRect/>
+          </a:stretch>
+        </p:blipFill>
+        <p:spPr>
+          <a:xfrm>
+            <a:off x="7247090" y="4876219"/>
+            <a:ext cx="4764198" cy="760533"/>
+          </a:xfrm>
+          <a:prstGeom prst="rect">
+            <a:avLst/>
+          </a:prstGeom>
+        </p:spPr>
+      </p:pic>
+    </p:spTree>
+    <p:extLst>
+      <p:ext uri="{BB962C8B-B14F-4D97-AF65-F5344CB8AC3E}">
+        <p14:creationId xmlns:p14="http://schemas.microsoft.com/office/powerpoint/2010/main" val="2037685945"/>
+      </p:ext>
+    </p:extLst>
+  </p:cSld>
+  <p:clrMapOvr>
+    <a:masterClrMapping/>
+  </p:clrMapOvr>
+</p:sld>
+</file>
+
+<file path=ppt/slides/slide5.xml><?xml version="1.0" encoding="utf-8"?>
+<p:sld xmlns:a="http://schemas.openxmlformats.org/drawingml/2006/main" xmlns:r="http://schemas.openxmlformats.org/officeDocument/2006/relationships" xmlns:p="http://schemas.openxmlformats.org/presentationml/2006/main">
+  <p:cSld>
+    <p:spTree>
+      <p:nvGrpSpPr>
+        <p:cNvPr id="1" name="">
+          <a:extLst>
+            <a:ext uri="{FF2B5EF4-FFF2-40B4-BE49-F238E27FC236}">
+              <a16:creationId xmlns:a16="http://schemas.microsoft.com/office/drawing/2014/main" id="{AF51C3CA-54D4-7362-9EEE-CACD920E2666}"/>
+            </a:ext>
+          </a:extLst>
+        </p:cNvPr>
+        <p:cNvGrpSpPr/>
+        <p:nvPr/>
+      </p:nvGrpSpPr>
+      <p:grpSpPr>
+        <a:xfrm>
+          <a:off x="0" y="0"/>
+          <a:ext cx="0" cy="0"/>
+          <a:chOff x="0" y="0"/>
+          <a:chExt cx="0" cy="0"/>
+        </a:xfrm>
+      </p:grpSpPr>
+      <p:sp>
+        <p:nvSpPr>
+          <p:cNvPr id="3" name="TextBox 2">
+            <a:extLst>
+              <a:ext uri="{FF2B5EF4-FFF2-40B4-BE49-F238E27FC236}">
+                <a16:creationId xmlns:a16="http://schemas.microsoft.com/office/drawing/2014/main" id="{2602EF79-37DE-96CB-63A5-2922A0AE7BDB}"/>
               </a:ext>
             </a:extLst>
           </p:cNvPr>
@@ -5127,8 +6048,8 @@
         </p:nvSpPr>
         <p:spPr>
           <a:xfrm>
-            <a:off x="427843" y="5277820"/>
-            <a:ext cx="1286657" cy="461665"/>
+            <a:off x="3145871" y="201130"/>
+            <a:ext cx="5234731" cy="646331"/>
           </a:xfrm>
           <a:prstGeom prst="rect">
             <a:avLst/>
@@ -5141,7 +6062,7 @@
           </a:bodyPr>
           <a:lstStyle/>
           <a:p>
-            <a:pPr marL="0" marR="0" lvl="0" indent="0" algn="l" defTabSz="914400" rtl="0" eaLnBrk="1" fontAlgn="auto" latinLnBrk="0" hangingPunct="1">
+            <a:pPr marL="0" marR="0" lvl="0" indent="0" algn="ctr" defTabSz="914400" rtl="0" eaLnBrk="1" fontAlgn="auto" latinLnBrk="0" hangingPunct="1">
               <a:lnSpc>
                 <a:spcPct val="100000"/>
               </a:lnSpc>
@@ -5159,7 +6080,7 @@
               <a:defRPr/>
             </a:pPr>
             <a:r>
-              <a:rPr kumimoji="0" lang="it-IT" sz="2400" b="0" i="0" u="none" strike="noStrike" kern="1200" cap="none" spc="0" normalizeH="0" baseline="0" noProof="0" dirty="0">
+              <a:rPr kumimoji="0" lang="it-IT" sz="3600" b="0" i="0" u="none" strike="noStrike" kern="1200" cap="none" spc="0" normalizeH="0" baseline="0" noProof="0" dirty="0">
                 <a:ln>
                   <a:noFill/>
                 </a:ln>
@@ -5170,7 +6091,348 @@
                 <a:ea typeface="+mn-ea"/>
                 <a:cs typeface="+mn-cs"/>
               </a:rPr>
-              <a:t>Use Case</a:t>
+              <a:t>A General Model </a:t>
+            </a:r>
+            <a:r>
+              <a:rPr kumimoji="0" lang="it-IT" sz="3600" b="0" i="0" u="none" strike="noStrike" kern="1200" cap="none" spc="0" normalizeH="0" baseline="0" noProof="0" dirty="0" err="1">
+                <a:ln>
+                  <a:noFill/>
+                </a:ln>
+                <a:effectLst/>
+                <a:uLnTx/>
+                <a:uFillTx/>
+                <a:latin typeface="Museo Sans Condensed" panose="02000000000000000000"/>
+                <a:ea typeface="+mn-ea"/>
+                <a:cs typeface="+mn-cs"/>
+              </a:rPr>
+              <a:t>Structure</a:t>
+            </a:r>
+            <a:endParaRPr kumimoji="0" lang="it-IT" sz="3600" b="0" i="0" u="none" strike="noStrike" kern="1200" cap="none" spc="0" normalizeH="0" baseline="0" noProof="0" dirty="0">
+              <a:ln>
+                <a:noFill/>
+              </a:ln>
+              <a:effectLst/>
+              <a:uLnTx/>
+              <a:uFillTx/>
+              <a:latin typeface="Museo Sans Condensed" panose="02000000000000000000"/>
+              <a:ea typeface="+mn-ea"/>
+              <a:cs typeface="+mn-cs"/>
+            </a:endParaRPr>
+          </a:p>
+        </p:txBody>
+      </p:sp>
+      <p:pic>
+        <p:nvPicPr>
+          <p:cNvPr id="15" name="Picture 14">
+            <a:extLst>
+              <a:ext uri="{FF2B5EF4-FFF2-40B4-BE49-F238E27FC236}">
+                <a16:creationId xmlns:a16="http://schemas.microsoft.com/office/drawing/2014/main" id="{05117AB4-55E8-41C5-60A1-2F67B2271982}"/>
+              </a:ext>
+            </a:extLst>
+          </p:cNvPr>
+          <p:cNvPicPr>
+            <a:picLocks noChangeAspect="1"/>
+          </p:cNvPicPr>
+          <p:nvPr/>
+        </p:nvPicPr>
+        <p:blipFill rotWithShape="1">
+          <a:blip r:embed="rId2"/>
+          <a:srcRect r="1766" b="2285"/>
+          <a:stretch/>
+        </p:blipFill>
+        <p:spPr>
+          <a:xfrm>
+            <a:off x="319168" y="1144818"/>
+            <a:ext cx="6850117" cy="5119795"/>
+          </a:xfrm>
+          <a:prstGeom prst="rect">
+            <a:avLst/>
+          </a:prstGeom>
+        </p:spPr>
+      </p:pic>
+      <p:sp>
+        <p:nvSpPr>
+          <p:cNvPr id="6" name="TextBox 5">
+            <a:extLst>
+              <a:ext uri="{FF2B5EF4-FFF2-40B4-BE49-F238E27FC236}">
+                <a16:creationId xmlns:a16="http://schemas.microsoft.com/office/drawing/2014/main" id="{73949C78-38C0-2BEE-77BD-5763FA0CEA25}"/>
+              </a:ext>
+            </a:extLst>
+          </p:cNvPr>
+          <p:cNvSpPr txBox="1"/>
+          <p:nvPr/>
+        </p:nvSpPr>
+        <p:spPr>
+          <a:xfrm>
+            <a:off x="7993272" y="4466102"/>
+            <a:ext cx="3879560" cy="1938992"/>
+          </a:xfrm>
+          <a:prstGeom prst="rect">
+            <a:avLst/>
+          </a:prstGeom>
+          <a:noFill/>
+        </p:spPr>
+        <p:txBody>
+          <a:bodyPr wrap="square" rtlCol="0">
+            <a:spAutoFit/>
+          </a:bodyPr>
+          <a:lstStyle/>
+          <a:p>
+            <a:pPr marL="0" marR="0" lvl="0" indent="0" defTabSz="914400" rtl="0" eaLnBrk="1" fontAlgn="auto" latinLnBrk="0" hangingPunct="1">
+              <a:lnSpc>
+                <a:spcPct val="100000"/>
+              </a:lnSpc>
+              <a:spcBef>
+                <a:spcPts val="0"/>
+              </a:spcBef>
+              <a:spcAft>
+                <a:spcPts val="0"/>
+              </a:spcAft>
+              <a:buClrTx/>
+              <a:buSzTx/>
+              <a:buFontTx/>
+              <a:buNone/>
+              <a:tabLst/>
+              <a:defRPr/>
+            </a:pPr>
+            <a:r>
+              <a:rPr lang="it-IT" sz="2400" dirty="0" err="1">
+                <a:latin typeface="Museo Sans Condensed" panose="02000000000000000000"/>
+              </a:rPr>
+              <a:t>Iteration</a:t>
+            </a:r>
+            <a:r>
+              <a:rPr lang="it-IT" sz="2400" dirty="0">
+                <a:latin typeface="Museo Sans Condensed" panose="02000000000000000000"/>
+              </a:rPr>
+              <a:t>: </a:t>
+            </a:r>
+            <a:r>
+              <a:rPr lang="en-US" sz="2400" dirty="0">
+                <a:latin typeface="Museo Sans"/>
+              </a:rPr>
+              <a:t>A single time step of the simulation. Each iteration corresponds to an update of the states of the nodes in the network</a:t>
+            </a:r>
+            <a:endParaRPr kumimoji="0" lang="it-IT" sz="2400" i="0" u="none" strike="noStrike" kern="1200" cap="none" spc="0" normalizeH="0" baseline="0" noProof="0" dirty="0">
+              <a:ln>
+                <a:noFill/>
+              </a:ln>
+              <a:effectLst/>
+              <a:uLnTx/>
+              <a:uFillTx/>
+              <a:latin typeface="Museo Sans"/>
+            </a:endParaRPr>
+          </a:p>
+        </p:txBody>
+      </p:sp>
+      <p:cxnSp>
+        <p:nvCxnSpPr>
+          <p:cNvPr id="8" name="Straight Connector 7">
+            <a:extLst>
+              <a:ext uri="{FF2B5EF4-FFF2-40B4-BE49-F238E27FC236}">
+                <a16:creationId xmlns:a16="http://schemas.microsoft.com/office/drawing/2014/main" id="{CD940529-E85F-D98A-0D54-7384AC3AB473}"/>
+              </a:ext>
+            </a:extLst>
+          </p:cNvPr>
+          <p:cNvCxnSpPr>
+            <a:cxnSpLocks/>
+          </p:cNvCxnSpPr>
+          <p:nvPr/>
+        </p:nvCxnSpPr>
+        <p:spPr>
+          <a:xfrm flipV="1">
+            <a:off x="3833769" y="4764947"/>
+            <a:ext cx="4026715" cy="1392572"/>
+          </a:xfrm>
+          <a:prstGeom prst="line">
+            <a:avLst/>
+          </a:prstGeom>
+          <a:ln>
+            <a:solidFill>
+              <a:schemeClr val="tx1"/>
+            </a:solidFill>
+          </a:ln>
+        </p:spPr>
+        <p:style>
+          <a:lnRef idx="1">
+            <a:schemeClr val="accent1"/>
+          </a:lnRef>
+          <a:fillRef idx="0">
+            <a:schemeClr val="accent1"/>
+          </a:fillRef>
+          <a:effectRef idx="0">
+            <a:schemeClr val="accent1"/>
+          </a:effectRef>
+          <a:fontRef idx="minor">
+            <a:schemeClr val="tx1"/>
+          </a:fontRef>
+        </p:style>
+      </p:cxnSp>
+      <p:sp>
+        <p:nvSpPr>
+          <p:cNvPr id="12" name="TextBox 11">
+            <a:extLst>
+              <a:ext uri="{FF2B5EF4-FFF2-40B4-BE49-F238E27FC236}">
+                <a16:creationId xmlns:a16="http://schemas.microsoft.com/office/drawing/2014/main" id="{E7572F88-F0CE-DBC6-B04D-53F91EDBD5F7}"/>
+              </a:ext>
+            </a:extLst>
+          </p:cNvPr>
+          <p:cNvSpPr txBox="1"/>
+          <p:nvPr/>
+        </p:nvSpPr>
+        <p:spPr>
+          <a:xfrm>
+            <a:off x="7993272" y="1328876"/>
+            <a:ext cx="3424145" cy="1477328"/>
+          </a:xfrm>
+          <a:prstGeom prst="rect">
+            <a:avLst/>
+          </a:prstGeom>
+          <a:noFill/>
+        </p:spPr>
+        <p:txBody>
+          <a:bodyPr wrap="square">
+            <a:spAutoFit/>
+          </a:bodyPr>
+          <a:lstStyle/>
+          <a:p>
+            <a:r>
+              <a:rPr lang="it-IT" dirty="0">
+                <a:latin typeface="Museo Sans"/>
+              </a:rPr>
+              <a:t>In the </a:t>
+            </a:r>
+            <a:r>
+              <a:rPr lang="it-IT" dirty="0" err="1">
+                <a:latin typeface="Museo Sans"/>
+              </a:rPr>
+              <a:t>graph</a:t>
+            </a:r>
+            <a:r>
+              <a:rPr lang="it-IT" dirty="0">
+                <a:latin typeface="Museo Sans"/>
+              </a:rPr>
+              <a:t>, the lines </a:t>
+            </a:r>
+            <a:r>
+              <a:rPr lang="it-IT" dirty="0" err="1">
+                <a:latin typeface="Museo Sans"/>
+              </a:rPr>
+              <a:t>represent</a:t>
+            </a:r>
+            <a:r>
+              <a:rPr lang="it-IT" dirty="0">
+                <a:latin typeface="Museo Sans"/>
+              </a:rPr>
+              <a:t> the </a:t>
+            </a:r>
+            <a:r>
+              <a:rPr lang="it-IT" dirty="0" err="1">
+                <a:latin typeface="Museo Sans"/>
+              </a:rPr>
+              <a:t>number</a:t>
+            </a:r>
+            <a:r>
+              <a:rPr lang="it-IT" dirty="0">
+                <a:latin typeface="Museo Sans"/>
+              </a:rPr>
+              <a:t> of </a:t>
+            </a:r>
+            <a:r>
+              <a:rPr lang="it-IT" dirty="0" err="1">
+                <a:latin typeface="Museo Sans"/>
+              </a:rPr>
+              <a:t>nodes</a:t>
+            </a:r>
+            <a:r>
+              <a:rPr lang="it-IT" dirty="0">
+                <a:latin typeface="Museo Sans"/>
+              </a:rPr>
+              <a:t> </a:t>
+            </a:r>
+            <a:r>
+              <a:rPr lang="it-IT" dirty="0" err="1">
+                <a:latin typeface="Museo Sans"/>
+              </a:rPr>
+              <a:t>that</a:t>
+            </a:r>
+            <a:r>
+              <a:rPr lang="it-IT" dirty="0">
+                <a:latin typeface="Museo Sans"/>
+              </a:rPr>
+              <a:t> </a:t>
+            </a:r>
+            <a:r>
+              <a:rPr lang="it-IT" dirty="0" err="1">
+                <a:latin typeface="Museo Sans"/>
+              </a:rPr>
+              <a:t>have</a:t>
+            </a:r>
+            <a:r>
+              <a:rPr lang="it-IT" dirty="0">
+                <a:latin typeface="Museo Sans"/>
+              </a:rPr>
+              <a:t> </a:t>
+            </a:r>
+            <a:r>
+              <a:rPr lang="it-IT" dirty="0" err="1">
+                <a:latin typeface="Museo Sans"/>
+              </a:rPr>
+              <a:t>each</a:t>
+            </a:r>
+            <a:r>
+              <a:rPr lang="it-IT" dirty="0">
+                <a:latin typeface="Museo Sans"/>
+              </a:rPr>
+              <a:t> of the </a:t>
+            </a:r>
+            <a:r>
+              <a:rPr lang="it-IT" dirty="0" err="1">
+                <a:latin typeface="Museo Sans"/>
+              </a:rPr>
+              <a:t>states</a:t>
+            </a:r>
+            <a:r>
+              <a:rPr lang="it-IT" dirty="0">
+                <a:latin typeface="Museo Sans"/>
+              </a:rPr>
+              <a:t> 0 (</a:t>
+            </a:r>
+            <a:r>
+              <a:rPr lang="it-IT" dirty="0" err="1">
+                <a:latin typeface="Museo Sans"/>
+              </a:rPr>
+              <a:t>Susceptible</a:t>
+            </a:r>
+            <a:r>
+              <a:rPr lang="it-IT" dirty="0">
+                <a:latin typeface="Museo Sans"/>
+              </a:rPr>
+              <a:t>), 1 (</a:t>
+            </a:r>
+            <a:r>
+              <a:rPr lang="it-IT" dirty="0" err="1">
+                <a:latin typeface="Museo Sans"/>
+              </a:rPr>
+              <a:t>Infected</a:t>
+            </a:r>
+            <a:r>
+              <a:rPr lang="it-IT" dirty="0">
+                <a:latin typeface="Museo Sans"/>
+              </a:rPr>
+              <a:t>), and 2 (</a:t>
+            </a:r>
+            <a:r>
+              <a:rPr lang="it-IT" dirty="0" err="1">
+                <a:latin typeface="Museo Sans"/>
+              </a:rPr>
+              <a:t>Removed</a:t>
+            </a:r>
+            <a:r>
+              <a:rPr lang="it-IT" dirty="0">
+                <a:latin typeface="Museo Sans"/>
+              </a:rPr>
+              <a:t>) over time.</a:t>
             </a:r>
           </a:p>
         </p:txBody>
@@ -5178,7 +6440,7 @@
     </p:spTree>
     <p:extLst>
       <p:ext uri="{BB962C8B-B14F-4D97-AF65-F5344CB8AC3E}">
-        <p14:creationId xmlns:p14="http://schemas.microsoft.com/office/powerpoint/2010/main" val="2949155999"/>
+        <p14:creationId xmlns:p14="http://schemas.microsoft.com/office/powerpoint/2010/main" val="2098586402"/>
       </p:ext>
     </p:extLst>
   </p:cSld>

</xml_diff>